<commit_message>
Actualización de datos en el Powerpoint
</commit_message>
<xml_diff>
--- a/doc/ContaminaciónLumínica.pptx
+++ b/doc/ContaminaciónLumínica.pptx
@@ -3118,11 +3118,7 @@
           <a:p>
             <a:r>
               <a:rPr lang="es-ES" dirty="0" smtClean="0"/>
-              <a:t>Alumbrado p</a:t>
-            </a:r>
-            <a:r>
-              <a:rPr lang="es-ES" dirty="0" smtClean="0"/>
-              <a:t>úblico y contaminación lumínica</a:t>
+              <a:t>Alumbrado público y contaminación lumínica</a:t>
             </a:r>
             <a:endParaRPr lang="es-ES" dirty="0"/>
           </a:p>
@@ -3414,11 +3410,7 @@
             <a:pPr lvl="1"/>
             <a:r>
               <a:rPr lang="es-ES" dirty="0" smtClean="0"/>
-              <a:t>Concienciar a los ciudadanos y ayuntamientos de la importancia de reducir la contaminaci</a:t>
-            </a:r>
-            <a:r>
-              <a:rPr lang="es-ES" dirty="0" smtClean="0"/>
-              <a:t>ón lumínica (</a:t>
+              <a:t>Concienciar a los ciudadanos y ayuntamientos de la importancia de reducir la contaminación lumínica (</a:t>
             </a:r>
             <a:r>
               <a:rPr lang="es-ES" dirty="0" smtClean="0">
@@ -3437,7 +3429,6 @@
               <a:rPr lang="es-ES" dirty="0" smtClean="0"/>
               <a:t>Reciente noticia en El Mundo:</a:t>
             </a:r>
-            <a:endParaRPr lang="es-ES" dirty="0" smtClean="0"/>
           </a:p>
           <a:p>
             <a:r>
@@ -3449,11 +3440,7 @@
             <a:pPr lvl="1"/>
             <a:r>
               <a:rPr lang="es-ES" dirty="0" smtClean="0"/>
-              <a:t>Conseguir que las ciudades publiquen sus datos sobre alumbrado p</a:t>
-            </a:r>
-            <a:r>
-              <a:rPr lang="es-ES" dirty="0" smtClean="0"/>
-              <a:t>úblico de manera homogénea</a:t>
+              <a:t>Conseguir que las ciudades publiquen sus datos sobre alumbrado público de manera homogénea</a:t>
             </a:r>
           </a:p>
           <a:p>
@@ -3537,11 +3524,7 @@
           <a:p>
             <a:r>
               <a:rPr lang="es-ES" dirty="0" smtClean="0"/>
-              <a:t>¿Qu</a:t>
-            </a:r>
-            <a:r>
-              <a:rPr lang="es-ES" dirty="0" smtClean="0"/>
-              <a:t>é haremos hoy?</a:t>
+              <a:t>¿Qué haremos hoy?</a:t>
             </a:r>
             <a:endParaRPr lang="es-ES" dirty="0"/>
           </a:p>
@@ -3566,11 +3549,7 @@
           <a:p>
             <a:r>
               <a:rPr lang="es-ES" dirty="0" smtClean="0"/>
-              <a:t>Depender</a:t>
-            </a:r>
-            <a:r>
-              <a:rPr lang="es-ES" dirty="0" smtClean="0"/>
-              <a:t>á del tamaño del equipo…</a:t>
+              <a:t>Dependerá del tamaño del equipo…</a:t>
             </a:r>
           </a:p>
           <a:p>
@@ -4162,11 +4141,7 @@
           <a:p>
             <a:r>
               <a:rPr lang="es-ES" dirty="0" smtClean="0"/>
-              <a:t>La red tem</a:t>
-            </a:r>
-            <a:r>
-              <a:rPr lang="es-ES" dirty="0" smtClean="0"/>
-              <a:t>ática sobre Open Data y Smart </a:t>
+              <a:t>La red temática sobre Open Data y Smart </a:t>
             </a:r>
             <a:r>
               <a:rPr lang="es-ES" dirty="0" err="1" smtClean="0"/>
@@ -4243,13 +4218,14 @@
               <a:t>Lucía García @</a:t>
             </a:r>
             <a:r>
-              <a:rPr lang="es-ES" dirty="0" err="1" smtClean="0"/>
-              <a:t>shekda</a:t>
+              <a:rPr lang="es-ES" smtClean="0"/>
+              <a:t>shedka</a:t>
             </a:r>
             <a:r>
               <a:rPr lang="es-ES" dirty="0" smtClean="0"/>
               <a:t> </a:t>
             </a:r>
+            <a:endParaRPr lang="es-ES" dirty="0" smtClean="0"/>
           </a:p>
           <a:p>
             <a:pPr lvl="1"/>

</xml_diff>